<commit_message>
Add minow update on slides for semantics
</commit_message>
<xml_diff>
--- a/models/AGREE_extend_semantics_tests/basic_semantics/AGREE_extend_semantics.pptx
+++ b/models/AGREE_extend_semantics_tests/basic_semantics/AGREE_extend_semantics.pptx
@@ -5,18 +5,11 @@
     <p:sldMasterId id="2147483648" r:id="rId1"/>
   </p:sldMasterIdLst>
   <p:notesMasterIdLst>
-    <p:notesMasterId r:id="rId11"/>
+    <p:notesMasterId r:id="rId4"/>
   </p:notesMasterIdLst>
   <p:sldIdLst>
-    <p:sldId id="257" r:id="rId2"/>
-    <p:sldId id="259" r:id="rId3"/>
-    <p:sldId id="258" r:id="rId4"/>
-    <p:sldId id="260" r:id="rId5"/>
-    <p:sldId id="261" r:id="rId6"/>
-    <p:sldId id="263" r:id="rId7"/>
-    <p:sldId id="262" r:id="rId8"/>
-    <p:sldId id="264" r:id="rId9"/>
-    <p:sldId id="265" r:id="rId10"/>
+    <p:sldId id="264" r:id="rId2"/>
+    <p:sldId id="265" r:id="rId3"/>
   </p:sldIdLst>
   <p:sldSz cx="12192000" cy="6858000"/>
   <p:notesSz cx="6858000" cy="9144000"/>
@@ -205,7 +198,7 @@
           <a:p>
             <a:fld id="{A81426A8-28F9-0548-851B-F0BF21D54054}" type="datetimeFigureOut">
               <a:rPr lang="en-US" smtClean="0"/>
-              <a:t>6/3/19</a:t>
+              <a:t>6/28/19</a:t>
             </a:fld>
             <a:endParaRPr lang="en-US"/>
           </a:p>
@@ -540,7 +533,7 @@
           <a:p>
             <a:fld id="{B930B076-600F-AE47-8627-6FFFAD9D008D}" type="slidenum">
               <a:rPr lang="en-US" smtClean="0"/>
-              <a:t>9</a:t>
+              <a:t>2</a:t>
             </a:fld>
             <a:endParaRPr lang="en-US"/>
           </a:p>
@@ -688,7 +681,7 @@
           <a:p>
             <a:fld id="{4F31663F-3CB8-450A-AF21-43B9C0CCAF49}" type="datetimeFigureOut">
               <a:rPr lang="en-US" smtClean="0"/>
-              <a:t>6/3/19</a:t>
+              <a:t>6/28/19</a:t>
             </a:fld>
             <a:endParaRPr lang="en-US"/>
           </a:p>
@@ -856,7 +849,7 @@
           <a:p>
             <a:fld id="{4F31663F-3CB8-450A-AF21-43B9C0CCAF49}" type="datetimeFigureOut">
               <a:rPr lang="en-US" smtClean="0"/>
-              <a:t>6/3/19</a:t>
+              <a:t>6/28/19</a:t>
             </a:fld>
             <a:endParaRPr lang="en-US"/>
           </a:p>
@@ -1034,7 +1027,7 @@
           <a:p>
             <a:fld id="{4F31663F-3CB8-450A-AF21-43B9C0CCAF49}" type="datetimeFigureOut">
               <a:rPr lang="en-US" smtClean="0"/>
-              <a:t>6/3/19</a:t>
+              <a:t>6/28/19</a:t>
             </a:fld>
             <a:endParaRPr lang="en-US"/>
           </a:p>
@@ -1202,7 +1195,7 @@
           <a:p>
             <a:fld id="{4F31663F-3CB8-450A-AF21-43B9C0CCAF49}" type="datetimeFigureOut">
               <a:rPr lang="en-US" smtClean="0"/>
-              <a:t>6/3/19</a:t>
+              <a:t>6/28/19</a:t>
             </a:fld>
             <a:endParaRPr lang="en-US"/>
           </a:p>
@@ -1447,7 +1440,7 @@
           <a:p>
             <a:fld id="{4F31663F-3CB8-450A-AF21-43B9C0CCAF49}" type="datetimeFigureOut">
               <a:rPr lang="en-US" smtClean="0"/>
-              <a:t>6/3/19</a:t>
+              <a:t>6/28/19</a:t>
             </a:fld>
             <a:endParaRPr lang="en-US"/>
           </a:p>
@@ -1676,7 +1669,7 @@
           <a:p>
             <a:fld id="{4F31663F-3CB8-450A-AF21-43B9C0CCAF49}" type="datetimeFigureOut">
               <a:rPr lang="en-US" smtClean="0"/>
-              <a:t>6/3/19</a:t>
+              <a:t>6/28/19</a:t>
             </a:fld>
             <a:endParaRPr lang="en-US"/>
           </a:p>
@@ -2040,7 +2033,7 @@
           <a:p>
             <a:fld id="{4F31663F-3CB8-450A-AF21-43B9C0CCAF49}" type="datetimeFigureOut">
               <a:rPr lang="en-US" smtClean="0"/>
-              <a:t>6/3/19</a:t>
+              <a:t>6/28/19</a:t>
             </a:fld>
             <a:endParaRPr lang="en-US"/>
           </a:p>
@@ -2157,7 +2150,7 @@
           <a:p>
             <a:fld id="{4F31663F-3CB8-450A-AF21-43B9C0CCAF49}" type="datetimeFigureOut">
               <a:rPr lang="en-US" smtClean="0"/>
-              <a:t>6/3/19</a:t>
+              <a:t>6/28/19</a:t>
             </a:fld>
             <a:endParaRPr lang="en-US"/>
           </a:p>
@@ -2252,7 +2245,7 @@
           <a:p>
             <a:fld id="{4F31663F-3CB8-450A-AF21-43B9C0CCAF49}" type="datetimeFigureOut">
               <a:rPr lang="en-US" smtClean="0"/>
-              <a:t>6/3/19</a:t>
+              <a:t>6/28/19</a:t>
             </a:fld>
             <a:endParaRPr lang="en-US"/>
           </a:p>
@@ -2527,7 +2520,7 @@
           <a:p>
             <a:fld id="{4F31663F-3CB8-450A-AF21-43B9C0CCAF49}" type="datetimeFigureOut">
               <a:rPr lang="en-US" smtClean="0"/>
-              <a:t>6/3/19</a:t>
+              <a:t>6/28/19</a:t>
             </a:fld>
             <a:endParaRPr lang="en-US"/>
           </a:p>
@@ -2779,7 +2772,7 @@
           <a:p>
             <a:fld id="{4F31663F-3CB8-450A-AF21-43B9C0CCAF49}" type="datetimeFigureOut">
               <a:rPr lang="en-US" smtClean="0"/>
-              <a:t>6/3/19</a:t>
+              <a:t>6/28/19</a:t>
             </a:fld>
             <a:endParaRPr lang="en-US"/>
           </a:p>
@@ -2990,7 +2983,7 @@
           <a:p>
             <a:fld id="{4F31663F-3CB8-450A-AF21-43B9C0CCAF49}" type="datetimeFigureOut">
               <a:rPr lang="en-US" smtClean="0"/>
-              <a:t>6/3/19</a:t>
+              <a:t>6/28/19</a:t>
             </a:fld>
             <a:endParaRPr lang="en-US"/>
           </a:p>
@@ -3397,1624 +3390,6 @@
       </p:grpSpPr>
       <p:sp>
         <p:nvSpPr>
-          <p:cNvPr id="4" name="Title 3"/>
-          <p:cNvSpPr>
-            <a:spLocks noGrp="1"/>
-          </p:cNvSpPr>
-          <p:nvPr>
-            <p:ph type="title"/>
-          </p:nvPr>
-        </p:nvSpPr>
-        <p:spPr/>
-        <p:txBody>
-          <a:bodyPr/>
-          <a:lstStyle/>
-          <a:p>
-            <a:r>
-              <a:rPr lang="en-US" dirty="0"/>
-              <a:t>UAV Mission Computer Software (Simplified)</a:t>
-            </a:r>
-          </a:p>
-        </p:txBody>
-      </p:sp>
-      <p:sp>
-        <p:nvSpPr>
-          <p:cNvPr id="5" name="Rectangle 4"/>
-          <p:cNvSpPr/>
-          <p:nvPr/>
-        </p:nvSpPr>
-        <p:spPr>
-          <a:xfrm>
-            <a:off x="713874" y="3320716"/>
-            <a:ext cx="2149642" cy="1676400"/>
-          </a:xfrm>
-          <a:prstGeom prst="rect">
-            <a:avLst/>
-          </a:prstGeom>
-          <a:noFill/>
-        </p:spPr>
-        <p:style>
-          <a:lnRef idx="2">
-            <a:schemeClr val="accent1">
-              <a:shade val="50000"/>
-            </a:schemeClr>
-          </a:lnRef>
-          <a:fillRef idx="1">
-            <a:schemeClr val="accent1"/>
-          </a:fillRef>
-          <a:effectRef idx="0">
-            <a:schemeClr val="accent1"/>
-          </a:effectRef>
-          <a:fontRef idx="minor">
-            <a:schemeClr val="lt1"/>
-          </a:fontRef>
-        </p:style>
-        <p:txBody>
-          <a:bodyPr rtlCol="0" anchor="ctr"/>
-          <a:lstStyle/>
-          <a:p>
-            <a:pPr algn="ctr"/>
-            <a:r>
-              <a:rPr lang="en-US" dirty="0">
-                <a:solidFill>
-                  <a:schemeClr val="tx1"/>
-                </a:solidFill>
-              </a:rPr>
-              <a:t>Radio Driver</a:t>
-            </a:r>
-          </a:p>
-        </p:txBody>
-      </p:sp>
-      <p:sp>
-        <p:nvSpPr>
-          <p:cNvPr id="6" name="Rectangle 5"/>
-          <p:cNvSpPr/>
-          <p:nvPr/>
-        </p:nvSpPr>
-        <p:spPr>
-          <a:xfrm>
-            <a:off x="5133474" y="3320716"/>
-            <a:ext cx="2149642" cy="1676400"/>
-          </a:xfrm>
-          <a:prstGeom prst="rect">
-            <a:avLst/>
-          </a:prstGeom>
-          <a:noFill/>
-        </p:spPr>
-        <p:style>
-          <a:lnRef idx="2">
-            <a:schemeClr val="accent1">
-              <a:shade val="50000"/>
-            </a:schemeClr>
-          </a:lnRef>
-          <a:fillRef idx="1">
-            <a:schemeClr val="accent1"/>
-          </a:fillRef>
-          <a:effectRef idx="0">
-            <a:schemeClr val="accent1"/>
-          </a:effectRef>
-          <a:fontRef idx="minor">
-            <a:schemeClr val="lt1"/>
-          </a:fontRef>
-        </p:style>
-        <p:txBody>
-          <a:bodyPr rtlCol="0" anchor="ctr"/>
-          <a:lstStyle/>
-          <a:p>
-            <a:pPr algn="ctr"/>
-            <a:r>
-              <a:rPr lang="en-US" dirty="0">
-                <a:solidFill>
-                  <a:schemeClr val="tx1"/>
-                </a:solidFill>
-              </a:rPr>
-              <a:t>Flight Planner</a:t>
-            </a:r>
-          </a:p>
-        </p:txBody>
-      </p:sp>
-      <p:sp>
-        <p:nvSpPr>
-          <p:cNvPr id="8" name="Rectangle 7"/>
-          <p:cNvSpPr/>
-          <p:nvPr/>
-        </p:nvSpPr>
-        <p:spPr>
-          <a:xfrm>
-            <a:off x="9553074" y="3320716"/>
-            <a:ext cx="2149642" cy="1676400"/>
-          </a:xfrm>
-          <a:prstGeom prst="rect">
-            <a:avLst/>
-          </a:prstGeom>
-          <a:noFill/>
-        </p:spPr>
-        <p:style>
-          <a:lnRef idx="2">
-            <a:schemeClr val="accent1">
-              <a:shade val="50000"/>
-            </a:schemeClr>
-          </a:lnRef>
-          <a:fillRef idx="1">
-            <a:schemeClr val="accent1"/>
-          </a:fillRef>
-          <a:effectRef idx="0">
-            <a:schemeClr val="accent1"/>
-          </a:effectRef>
-          <a:fontRef idx="minor">
-            <a:schemeClr val="lt1"/>
-          </a:fontRef>
-        </p:style>
-        <p:txBody>
-          <a:bodyPr rtlCol="0" anchor="ctr"/>
-          <a:lstStyle/>
-          <a:p>
-            <a:pPr algn="ctr"/>
-            <a:r>
-              <a:rPr lang="en-US" dirty="0">
-                <a:solidFill>
-                  <a:schemeClr val="tx1"/>
-                </a:solidFill>
-              </a:rPr>
-              <a:t>UART Driver</a:t>
-            </a:r>
-          </a:p>
-        </p:txBody>
-      </p:sp>
-      <p:cxnSp>
-        <p:nvCxnSpPr>
-          <p:cNvPr id="12" name="Straight Arrow Connector 11"/>
-          <p:cNvCxnSpPr>
-            <a:stCxn id="6" idx="3"/>
-            <a:endCxn id="8" idx="1"/>
-          </p:cNvCxnSpPr>
-          <p:nvPr/>
-        </p:nvCxnSpPr>
-        <p:spPr>
-          <a:xfrm>
-            <a:off x="7283116" y="4158916"/>
-            <a:ext cx="2269958" cy="0"/>
-          </a:xfrm>
-          <a:prstGeom prst="straightConnector1">
-            <a:avLst/>
-          </a:prstGeom>
-          <a:ln>
-            <a:tailEnd type="triangle"/>
-          </a:ln>
-        </p:spPr>
-        <p:style>
-          <a:lnRef idx="1">
-            <a:schemeClr val="accent1"/>
-          </a:lnRef>
-          <a:fillRef idx="0">
-            <a:schemeClr val="accent1"/>
-          </a:fillRef>
-          <a:effectRef idx="0">
-            <a:schemeClr val="accent1"/>
-          </a:effectRef>
-          <a:fontRef idx="minor">
-            <a:schemeClr val="tx1"/>
-          </a:fontRef>
-        </p:style>
-      </p:cxnSp>
-      <p:cxnSp>
-        <p:nvCxnSpPr>
-          <p:cNvPr id="14" name="Straight Arrow Connector 13"/>
-          <p:cNvCxnSpPr>
-            <a:stCxn id="5" idx="3"/>
-            <a:endCxn id="6" idx="1"/>
-          </p:cNvCxnSpPr>
-          <p:nvPr/>
-        </p:nvCxnSpPr>
-        <p:spPr>
-          <a:xfrm>
-            <a:off x="2863516" y="4158916"/>
-            <a:ext cx="2269958" cy="0"/>
-          </a:xfrm>
-          <a:prstGeom prst="straightConnector1">
-            <a:avLst/>
-          </a:prstGeom>
-          <a:ln>
-            <a:tailEnd type="triangle"/>
-          </a:ln>
-        </p:spPr>
-        <p:style>
-          <a:lnRef idx="1">
-            <a:schemeClr val="accent1"/>
-          </a:lnRef>
-          <a:fillRef idx="0">
-            <a:schemeClr val="accent1"/>
-          </a:fillRef>
-          <a:effectRef idx="0">
-            <a:schemeClr val="accent1"/>
-          </a:effectRef>
-          <a:fontRef idx="minor">
-            <a:schemeClr val="tx1"/>
-          </a:fontRef>
-        </p:style>
-      </p:cxnSp>
-      <p:sp>
-        <p:nvSpPr>
-          <p:cNvPr id="15" name="TextBox 14"/>
-          <p:cNvSpPr txBox="1"/>
-          <p:nvPr/>
-        </p:nvSpPr>
-        <p:spPr>
-          <a:xfrm>
-            <a:off x="1518406" y="4950744"/>
-            <a:ext cx="2021747" cy="646331"/>
-          </a:xfrm>
-          <a:prstGeom prst="rect">
-            <a:avLst/>
-          </a:prstGeom>
-          <a:noFill/>
-        </p:spPr>
-        <p:txBody>
-          <a:bodyPr wrap="square" rtlCol="0">
-            <a:spAutoFit/>
-          </a:bodyPr>
-          <a:lstStyle/>
-          <a:p>
-            <a:r>
-              <a:rPr lang="en-US" dirty="0"/>
-              <a:t>G: message is Valid (authenticated)</a:t>
-            </a:r>
-          </a:p>
-        </p:txBody>
-      </p:sp>
-      <p:sp>
-        <p:nvSpPr>
-          <p:cNvPr id="16" name="TextBox 15"/>
-          <p:cNvSpPr txBox="1"/>
-          <p:nvPr/>
-        </p:nvSpPr>
-        <p:spPr>
-          <a:xfrm>
-            <a:off x="4575238" y="2535885"/>
-            <a:ext cx="1392572" cy="646331"/>
-          </a:xfrm>
-          <a:prstGeom prst="rect">
-            <a:avLst/>
-          </a:prstGeom>
-          <a:noFill/>
-        </p:spPr>
-        <p:txBody>
-          <a:bodyPr wrap="square" rtlCol="0">
-            <a:spAutoFit/>
-          </a:bodyPr>
-          <a:lstStyle/>
-          <a:p>
-            <a:r>
-              <a:rPr lang="en-US" dirty="0"/>
-              <a:t>A: message is Valid</a:t>
-            </a:r>
-          </a:p>
-        </p:txBody>
-      </p:sp>
-      <p:sp>
-        <p:nvSpPr>
-          <p:cNvPr id="17" name="TextBox 16"/>
-          <p:cNvSpPr txBox="1"/>
-          <p:nvPr/>
-        </p:nvSpPr>
-        <p:spPr>
-          <a:xfrm>
-            <a:off x="6272242" y="4997116"/>
-            <a:ext cx="2021747" cy="646331"/>
-          </a:xfrm>
-          <a:prstGeom prst="rect">
-            <a:avLst/>
-          </a:prstGeom>
-          <a:noFill/>
-        </p:spPr>
-        <p:txBody>
-          <a:bodyPr wrap="square" rtlCol="0">
-            <a:spAutoFit/>
-          </a:bodyPr>
-          <a:lstStyle/>
-          <a:p>
-            <a:r>
-              <a:rPr lang="en-US" dirty="0"/>
-              <a:t>G: well-formed mission</a:t>
-            </a:r>
-          </a:p>
-        </p:txBody>
-      </p:sp>
-    </p:spTree>
-    <p:extLst>
-      <p:ext uri="{BB962C8B-B14F-4D97-AF65-F5344CB8AC3E}">
-        <p14:creationId xmlns:p14="http://schemas.microsoft.com/office/powerpoint/2010/main" val="239699650"/>
-      </p:ext>
-    </p:extLst>
-  </p:cSld>
-  <p:clrMapOvr>
-    <a:masterClrMapping/>
-  </p:clrMapOvr>
-</p:sld>
-</file>
-
-<file path=ppt/slides/slide2.xml><?xml version="1.0" encoding="utf-8"?>
-<p:sld xmlns:a="http://schemas.openxmlformats.org/drawingml/2006/main" xmlns:r="http://schemas.openxmlformats.org/officeDocument/2006/relationships" xmlns:p="http://schemas.openxmlformats.org/presentationml/2006/main">
-  <p:cSld>
-    <p:spTree>
-      <p:nvGrpSpPr>
-        <p:cNvPr id="1" name=""/>
-        <p:cNvGrpSpPr/>
-        <p:nvPr/>
-      </p:nvGrpSpPr>
-      <p:grpSpPr>
-        <a:xfrm>
-          <a:off x="0" y="0"/>
-          <a:ext cx="0" cy="0"/>
-          <a:chOff x="0" y="0"/>
-          <a:chExt cx="0" cy="0"/>
-        </a:xfrm>
-      </p:grpSpPr>
-      <p:sp>
-        <p:nvSpPr>
-          <p:cNvPr id="2" name="Title 1"/>
-          <p:cNvSpPr>
-            <a:spLocks noGrp="1"/>
-          </p:cNvSpPr>
-          <p:nvPr>
-            <p:ph type="title"/>
-          </p:nvPr>
-        </p:nvSpPr>
-        <p:spPr/>
-        <p:txBody>
-          <a:bodyPr/>
-          <a:lstStyle/>
-          <a:p>
-            <a:endParaRPr lang="en-US"/>
-          </a:p>
-        </p:txBody>
-      </p:sp>
-      <p:pic>
-        <p:nvPicPr>
-          <p:cNvPr id="3" name="Picture 2"/>
-          <p:cNvPicPr>
-            <a:picLocks noChangeAspect="1"/>
-          </p:cNvPicPr>
-          <p:nvPr/>
-        </p:nvPicPr>
-        <p:blipFill>
-          <a:blip r:embed="rId2"/>
-          <a:stretch>
-            <a:fillRect/>
-          </a:stretch>
-        </p:blipFill>
-        <p:spPr>
-          <a:xfrm>
-            <a:off x="300789" y="211054"/>
-            <a:ext cx="11430000" cy="2457450"/>
-          </a:xfrm>
-          <a:prstGeom prst="rect">
-            <a:avLst/>
-          </a:prstGeom>
-        </p:spPr>
-      </p:pic>
-      <p:pic>
-        <p:nvPicPr>
-          <p:cNvPr id="5" name="Picture 4"/>
-          <p:cNvPicPr>
-            <a:picLocks noChangeAspect="1"/>
-          </p:cNvPicPr>
-          <p:nvPr/>
-        </p:nvPicPr>
-        <p:blipFill>
-          <a:blip r:embed="rId3"/>
-          <a:stretch>
-            <a:fillRect/>
-          </a:stretch>
-        </p:blipFill>
-        <p:spPr>
-          <a:xfrm>
-            <a:off x="6737684" y="3398365"/>
-            <a:ext cx="5105149" cy="2813939"/>
-          </a:xfrm>
-          <a:prstGeom prst="rect">
-            <a:avLst/>
-          </a:prstGeom>
-        </p:spPr>
-      </p:pic>
-      <p:pic>
-        <p:nvPicPr>
-          <p:cNvPr id="6" name="Picture 5"/>
-          <p:cNvPicPr>
-            <a:picLocks noChangeAspect="1"/>
-          </p:cNvPicPr>
-          <p:nvPr/>
-        </p:nvPicPr>
-        <p:blipFill>
-          <a:blip r:embed="rId4"/>
-          <a:stretch>
-            <a:fillRect/>
-          </a:stretch>
-        </p:blipFill>
-        <p:spPr>
-          <a:xfrm>
-            <a:off x="430129" y="3133605"/>
-            <a:ext cx="5361071" cy="3014532"/>
-          </a:xfrm>
-          <a:prstGeom prst="rect">
-            <a:avLst/>
-          </a:prstGeom>
-        </p:spPr>
-      </p:pic>
-    </p:spTree>
-    <p:extLst>
-      <p:ext uri="{BB962C8B-B14F-4D97-AF65-F5344CB8AC3E}">
-        <p14:creationId xmlns:p14="http://schemas.microsoft.com/office/powerpoint/2010/main" val="669842840"/>
-      </p:ext>
-    </p:extLst>
-  </p:cSld>
-  <p:clrMapOvr>
-    <a:masterClrMapping/>
-  </p:clrMapOvr>
-</p:sld>
-</file>
-
-<file path=ppt/slides/slide3.xml><?xml version="1.0" encoding="utf-8"?>
-<p:sld xmlns:a="http://schemas.openxmlformats.org/drawingml/2006/main" xmlns:r="http://schemas.openxmlformats.org/officeDocument/2006/relationships" xmlns:p="http://schemas.openxmlformats.org/presentationml/2006/main">
-  <p:cSld>
-    <p:spTree>
-      <p:nvGrpSpPr>
-        <p:cNvPr id="1" name=""/>
-        <p:cNvGrpSpPr/>
-        <p:nvPr/>
-      </p:nvGrpSpPr>
-      <p:grpSpPr>
-        <a:xfrm>
-          <a:off x="0" y="0"/>
-          <a:ext cx="0" cy="0"/>
-          <a:chOff x="0" y="0"/>
-          <a:chExt cx="0" cy="0"/>
-        </a:xfrm>
-      </p:grpSpPr>
-      <p:sp>
-        <p:nvSpPr>
-          <p:cNvPr id="4" name="Title 3"/>
-          <p:cNvSpPr>
-            <a:spLocks noGrp="1"/>
-          </p:cNvSpPr>
-          <p:nvPr>
-            <p:ph type="title"/>
-          </p:nvPr>
-        </p:nvSpPr>
-        <p:spPr/>
-        <p:txBody>
-          <a:bodyPr/>
-          <a:lstStyle/>
-          <a:p>
-            <a:r>
-              <a:rPr lang="en-US" dirty="0"/>
-              <a:t>UAV Mission Computer Software (Simplified)</a:t>
-            </a:r>
-            <a:br>
-              <a:rPr lang="en-US" dirty="0"/>
-            </a:br>
-            <a:r>
-              <a:rPr lang="en-US" sz="3200" dirty="0"/>
-              <a:t>with Attestation Manager model transformation</a:t>
-            </a:r>
-            <a:endParaRPr lang="en-US" dirty="0"/>
-          </a:p>
-        </p:txBody>
-      </p:sp>
-      <p:sp>
-        <p:nvSpPr>
-          <p:cNvPr id="5" name="Rectangle 4"/>
-          <p:cNvSpPr/>
-          <p:nvPr/>
-        </p:nvSpPr>
-        <p:spPr>
-          <a:xfrm>
-            <a:off x="713874" y="3320716"/>
-            <a:ext cx="2149642" cy="1676400"/>
-          </a:xfrm>
-          <a:prstGeom prst="rect">
-            <a:avLst/>
-          </a:prstGeom>
-          <a:noFill/>
-        </p:spPr>
-        <p:style>
-          <a:lnRef idx="2">
-            <a:schemeClr val="accent1">
-              <a:shade val="50000"/>
-            </a:schemeClr>
-          </a:lnRef>
-          <a:fillRef idx="1">
-            <a:schemeClr val="accent1"/>
-          </a:fillRef>
-          <a:effectRef idx="0">
-            <a:schemeClr val="accent1"/>
-          </a:effectRef>
-          <a:fontRef idx="minor">
-            <a:schemeClr val="lt1"/>
-          </a:fontRef>
-        </p:style>
-        <p:txBody>
-          <a:bodyPr rtlCol="0" anchor="ctr"/>
-          <a:lstStyle/>
-          <a:p>
-            <a:pPr algn="ctr"/>
-            <a:r>
-              <a:rPr lang="en-US" dirty="0">
-                <a:solidFill>
-                  <a:schemeClr val="tx1"/>
-                </a:solidFill>
-              </a:rPr>
-              <a:t>Radio Driver</a:t>
-            </a:r>
-          </a:p>
-        </p:txBody>
-      </p:sp>
-      <p:sp>
-        <p:nvSpPr>
-          <p:cNvPr id="6" name="Rectangle 5"/>
-          <p:cNvSpPr/>
-          <p:nvPr/>
-        </p:nvSpPr>
-        <p:spPr>
-          <a:xfrm>
-            <a:off x="6643494" y="3320716"/>
-            <a:ext cx="2149642" cy="1676400"/>
-          </a:xfrm>
-          <a:prstGeom prst="rect">
-            <a:avLst/>
-          </a:prstGeom>
-          <a:noFill/>
-        </p:spPr>
-        <p:style>
-          <a:lnRef idx="2">
-            <a:schemeClr val="accent1">
-              <a:shade val="50000"/>
-            </a:schemeClr>
-          </a:lnRef>
-          <a:fillRef idx="1">
-            <a:schemeClr val="accent1"/>
-          </a:fillRef>
-          <a:effectRef idx="0">
-            <a:schemeClr val="accent1"/>
-          </a:effectRef>
-          <a:fontRef idx="minor">
-            <a:schemeClr val="lt1"/>
-          </a:fontRef>
-        </p:style>
-        <p:txBody>
-          <a:bodyPr rtlCol="0" anchor="ctr"/>
-          <a:lstStyle/>
-          <a:p>
-            <a:pPr algn="ctr"/>
-            <a:r>
-              <a:rPr lang="en-US" dirty="0">
-                <a:solidFill>
-                  <a:schemeClr val="tx1"/>
-                </a:solidFill>
-              </a:rPr>
-              <a:t>Flight Planner</a:t>
-            </a:r>
-          </a:p>
-        </p:txBody>
-      </p:sp>
-      <p:sp>
-        <p:nvSpPr>
-          <p:cNvPr id="8" name="Rectangle 7"/>
-          <p:cNvSpPr/>
-          <p:nvPr/>
-        </p:nvSpPr>
-        <p:spPr>
-          <a:xfrm>
-            <a:off x="9553074" y="3320716"/>
-            <a:ext cx="2149642" cy="1676400"/>
-          </a:xfrm>
-          <a:prstGeom prst="rect">
-            <a:avLst/>
-          </a:prstGeom>
-          <a:noFill/>
-        </p:spPr>
-        <p:style>
-          <a:lnRef idx="2">
-            <a:schemeClr val="accent1">
-              <a:shade val="50000"/>
-            </a:schemeClr>
-          </a:lnRef>
-          <a:fillRef idx="1">
-            <a:schemeClr val="accent1"/>
-          </a:fillRef>
-          <a:effectRef idx="0">
-            <a:schemeClr val="accent1"/>
-          </a:effectRef>
-          <a:fontRef idx="minor">
-            <a:schemeClr val="lt1"/>
-          </a:fontRef>
-        </p:style>
-        <p:txBody>
-          <a:bodyPr rtlCol="0" anchor="ctr"/>
-          <a:lstStyle/>
-          <a:p>
-            <a:pPr algn="ctr"/>
-            <a:r>
-              <a:rPr lang="en-US" dirty="0">
-                <a:solidFill>
-                  <a:schemeClr val="tx1"/>
-                </a:solidFill>
-              </a:rPr>
-              <a:t>UART Driver</a:t>
-            </a:r>
-          </a:p>
-        </p:txBody>
-      </p:sp>
-      <p:cxnSp>
-        <p:nvCxnSpPr>
-          <p:cNvPr id="12" name="Straight Arrow Connector 11"/>
-          <p:cNvCxnSpPr>
-            <a:stCxn id="6" idx="3"/>
-            <a:endCxn id="8" idx="1"/>
-          </p:cNvCxnSpPr>
-          <p:nvPr/>
-        </p:nvCxnSpPr>
-        <p:spPr>
-          <a:xfrm>
-            <a:off x="8793136" y="4158916"/>
-            <a:ext cx="759938" cy="0"/>
-          </a:xfrm>
-          <a:prstGeom prst="straightConnector1">
-            <a:avLst/>
-          </a:prstGeom>
-          <a:ln>
-            <a:tailEnd type="triangle"/>
-          </a:ln>
-        </p:spPr>
-        <p:style>
-          <a:lnRef idx="1">
-            <a:schemeClr val="accent1"/>
-          </a:lnRef>
-          <a:fillRef idx="0">
-            <a:schemeClr val="accent1"/>
-          </a:fillRef>
-          <a:effectRef idx="0">
-            <a:schemeClr val="accent1"/>
-          </a:effectRef>
-          <a:fontRef idx="minor">
-            <a:schemeClr val="tx1"/>
-          </a:fontRef>
-        </p:style>
-      </p:cxnSp>
-      <p:cxnSp>
-        <p:nvCxnSpPr>
-          <p:cNvPr id="14" name="Straight Arrow Connector 13"/>
-          <p:cNvCxnSpPr>
-            <a:stCxn id="20" idx="3"/>
-            <a:endCxn id="6" idx="1"/>
-          </p:cNvCxnSpPr>
-          <p:nvPr/>
-        </p:nvCxnSpPr>
-        <p:spPr>
-          <a:xfrm>
-            <a:off x="6023811" y="4158916"/>
-            <a:ext cx="619683" cy="0"/>
-          </a:xfrm>
-          <a:prstGeom prst="straightConnector1">
-            <a:avLst/>
-          </a:prstGeom>
-          <a:ln>
-            <a:tailEnd type="triangle"/>
-          </a:ln>
-        </p:spPr>
-        <p:style>
-          <a:lnRef idx="1">
-            <a:schemeClr val="accent1"/>
-          </a:lnRef>
-          <a:fillRef idx="0">
-            <a:schemeClr val="accent1"/>
-          </a:fillRef>
-          <a:effectRef idx="0">
-            <a:schemeClr val="accent1"/>
-          </a:effectRef>
-          <a:fontRef idx="minor">
-            <a:schemeClr val="tx1"/>
-          </a:fontRef>
-        </p:style>
-      </p:cxnSp>
-      <p:sp>
-        <p:nvSpPr>
-          <p:cNvPr id="15" name="TextBox 14"/>
-          <p:cNvSpPr txBox="1"/>
-          <p:nvPr/>
-        </p:nvSpPr>
-        <p:spPr>
-          <a:xfrm>
-            <a:off x="1954266" y="4966445"/>
-            <a:ext cx="1345110" cy="646331"/>
-          </a:xfrm>
-          <a:prstGeom prst="rect">
-            <a:avLst/>
-          </a:prstGeom>
-          <a:noFill/>
-        </p:spPr>
-        <p:txBody>
-          <a:bodyPr wrap="square" rtlCol="0">
-            <a:spAutoFit/>
-          </a:bodyPr>
-          <a:lstStyle/>
-          <a:p>
-            <a:r>
-              <a:rPr lang="en-US" dirty="0"/>
-              <a:t>G: Valid message</a:t>
-            </a:r>
-          </a:p>
-        </p:txBody>
-      </p:sp>
-      <p:sp>
-        <p:nvSpPr>
-          <p:cNvPr id="16" name="TextBox 15"/>
-          <p:cNvSpPr txBox="1"/>
-          <p:nvPr/>
-        </p:nvSpPr>
-        <p:spPr>
-          <a:xfrm>
-            <a:off x="6643494" y="2353262"/>
-            <a:ext cx="1392572" cy="923330"/>
-          </a:xfrm>
-          <a:prstGeom prst="rect">
-            <a:avLst/>
-          </a:prstGeom>
-          <a:noFill/>
-        </p:spPr>
-        <p:txBody>
-          <a:bodyPr wrap="square" rtlCol="0">
-            <a:spAutoFit/>
-          </a:bodyPr>
-          <a:lstStyle/>
-          <a:p>
-            <a:r>
-              <a:rPr lang="en-US" dirty="0"/>
-              <a:t>A: message is Valid and Trusted</a:t>
-            </a:r>
-          </a:p>
-        </p:txBody>
-      </p:sp>
-      <p:sp>
-        <p:nvSpPr>
-          <p:cNvPr id="17" name="TextBox 16"/>
-          <p:cNvSpPr txBox="1"/>
-          <p:nvPr/>
-        </p:nvSpPr>
-        <p:spPr>
-          <a:xfrm>
-            <a:off x="7782262" y="4997116"/>
-            <a:ext cx="2021747" cy="646331"/>
-          </a:xfrm>
-          <a:prstGeom prst="rect">
-            <a:avLst/>
-          </a:prstGeom>
-          <a:noFill/>
-        </p:spPr>
-        <p:txBody>
-          <a:bodyPr wrap="square" rtlCol="0">
-            <a:spAutoFit/>
-          </a:bodyPr>
-          <a:lstStyle/>
-          <a:p>
-            <a:r>
-              <a:rPr lang="en-US" dirty="0"/>
-              <a:t>G: well-formed mission</a:t>
-            </a:r>
-          </a:p>
-        </p:txBody>
-      </p:sp>
-      <p:sp>
-        <p:nvSpPr>
-          <p:cNvPr id="20" name="Rectangle 19"/>
-          <p:cNvSpPr/>
-          <p:nvPr/>
-        </p:nvSpPr>
-        <p:spPr>
-          <a:xfrm>
-            <a:off x="3874169" y="3320716"/>
-            <a:ext cx="2149642" cy="1676400"/>
-          </a:xfrm>
-          <a:prstGeom prst="rect">
-            <a:avLst/>
-          </a:prstGeom>
-          <a:noFill/>
-        </p:spPr>
-        <p:style>
-          <a:lnRef idx="2">
-            <a:schemeClr val="accent1">
-              <a:shade val="50000"/>
-            </a:schemeClr>
-          </a:lnRef>
-          <a:fillRef idx="1">
-            <a:schemeClr val="accent1"/>
-          </a:fillRef>
-          <a:effectRef idx="0">
-            <a:schemeClr val="accent1"/>
-          </a:effectRef>
-          <a:fontRef idx="minor">
-            <a:schemeClr val="lt1"/>
-          </a:fontRef>
-        </p:style>
-        <p:txBody>
-          <a:bodyPr rtlCol="0" anchor="ctr"/>
-          <a:lstStyle/>
-          <a:p>
-            <a:pPr algn="ctr"/>
-            <a:r>
-              <a:rPr lang="en-US" dirty="0">
-                <a:solidFill>
-                  <a:schemeClr val="tx1"/>
-                </a:solidFill>
-              </a:rPr>
-              <a:t>Attestation Manager</a:t>
-            </a:r>
-          </a:p>
-        </p:txBody>
-      </p:sp>
-      <p:cxnSp>
-        <p:nvCxnSpPr>
-          <p:cNvPr id="21" name="Straight Arrow Connector 20"/>
-          <p:cNvCxnSpPr/>
-          <p:nvPr/>
-        </p:nvCxnSpPr>
-        <p:spPr>
-          <a:xfrm>
-            <a:off x="2863516" y="4563979"/>
-            <a:ext cx="1010653" cy="8021"/>
-          </a:xfrm>
-          <a:prstGeom prst="straightConnector1">
-            <a:avLst/>
-          </a:prstGeom>
-          <a:ln>
-            <a:tailEnd type="triangle"/>
-          </a:ln>
-        </p:spPr>
-        <p:style>
-          <a:lnRef idx="1">
-            <a:schemeClr val="accent1"/>
-          </a:lnRef>
-          <a:fillRef idx="0">
-            <a:schemeClr val="accent1"/>
-          </a:fillRef>
-          <a:effectRef idx="0">
-            <a:schemeClr val="accent1"/>
-          </a:effectRef>
-          <a:fontRef idx="minor">
-            <a:schemeClr val="tx1"/>
-          </a:fontRef>
-        </p:style>
-      </p:cxnSp>
-      <p:cxnSp>
-        <p:nvCxnSpPr>
-          <p:cNvPr id="22" name="Straight Arrow Connector 21"/>
-          <p:cNvCxnSpPr/>
-          <p:nvPr/>
-        </p:nvCxnSpPr>
-        <p:spPr>
-          <a:xfrm>
-            <a:off x="2863516" y="3842084"/>
-            <a:ext cx="1010653" cy="0"/>
-          </a:xfrm>
-          <a:prstGeom prst="straightConnector1">
-            <a:avLst/>
-          </a:prstGeom>
-          <a:ln>
-            <a:tailEnd type="triangle"/>
-          </a:ln>
-        </p:spPr>
-        <p:style>
-          <a:lnRef idx="1">
-            <a:schemeClr val="accent1"/>
-          </a:lnRef>
-          <a:fillRef idx="0">
-            <a:schemeClr val="accent1"/>
-          </a:fillRef>
-          <a:effectRef idx="0">
-            <a:schemeClr val="accent1"/>
-          </a:effectRef>
-          <a:fontRef idx="minor">
-            <a:schemeClr val="tx1"/>
-          </a:fontRef>
-        </p:style>
-      </p:cxnSp>
-      <p:cxnSp>
-        <p:nvCxnSpPr>
-          <p:cNvPr id="23" name="Straight Arrow Connector 22"/>
-          <p:cNvCxnSpPr/>
-          <p:nvPr/>
-        </p:nvCxnSpPr>
-        <p:spPr>
-          <a:xfrm flipH="1" flipV="1">
-            <a:off x="2863516" y="3617494"/>
-            <a:ext cx="1010653" cy="8021"/>
-          </a:xfrm>
-          <a:prstGeom prst="straightConnector1">
-            <a:avLst/>
-          </a:prstGeom>
-          <a:ln>
-            <a:tailEnd type="triangle"/>
-          </a:ln>
-        </p:spPr>
-        <p:style>
-          <a:lnRef idx="1">
-            <a:schemeClr val="accent1"/>
-          </a:lnRef>
-          <a:fillRef idx="0">
-            <a:schemeClr val="accent1"/>
-          </a:fillRef>
-          <a:effectRef idx="0">
-            <a:schemeClr val="accent1"/>
-          </a:effectRef>
-          <a:fontRef idx="minor">
-            <a:schemeClr val="tx1"/>
-          </a:fontRef>
-        </p:style>
-      </p:cxnSp>
-      <p:sp>
-        <p:nvSpPr>
-          <p:cNvPr id="24" name="TextBox 23"/>
-          <p:cNvSpPr txBox="1"/>
-          <p:nvPr/>
-        </p:nvSpPr>
-        <p:spPr>
-          <a:xfrm>
-            <a:off x="3787703" y="2678668"/>
-            <a:ext cx="1392572" cy="646331"/>
-          </a:xfrm>
-          <a:prstGeom prst="rect">
-            <a:avLst/>
-          </a:prstGeom>
-          <a:noFill/>
-        </p:spPr>
-        <p:txBody>
-          <a:bodyPr wrap="square" rtlCol="0">
-            <a:spAutoFit/>
-          </a:bodyPr>
-          <a:lstStyle/>
-          <a:p>
-            <a:r>
-              <a:rPr lang="en-US" dirty="0"/>
-              <a:t>A: Valid message</a:t>
-            </a:r>
-          </a:p>
-        </p:txBody>
-      </p:sp>
-      <p:sp>
-        <p:nvSpPr>
-          <p:cNvPr id="25" name="TextBox 24"/>
-          <p:cNvSpPr txBox="1"/>
-          <p:nvPr/>
-        </p:nvSpPr>
-        <p:spPr>
-          <a:xfrm>
-            <a:off x="5080346" y="4993785"/>
-            <a:ext cx="2021747" cy="923330"/>
-          </a:xfrm>
-          <a:prstGeom prst="rect">
-            <a:avLst/>
-          </a:prstGeom>
-          <a:noFill/>
-        </p:spPr>
-        <p:txBody>
-          <a:bodyPr wrap="square" rtlCol="0">
-            <a:spAutoFit/>
-          </a:bodyPr>
-          <a:lstStyle/>
-          <a:p>
-            <a:r>
-              <a:rPr lang="en-US" dirty="0"/>
-              <a:t>G: message is Trusted (passes remote attestation)</a:t>
-            </a:r>
-          </a:p>
-        </p:txBody>
-      </p:sp>
-    </p:spTree>
-    <p:extLst>
-      <p:ext uri="{BB962C8B-B14F-4D97-AF65-F5344CB8AC3E}">
-        <p14:creationId xmlns:p14="http://schemas.microsoft.com/office/powerpoint/2010/main" val="4236928823"/>
-      </p:ext>
-    </p:extLst>
-  </p:cSld>
-  <p:clrMapOvr>
-    <a:masterClrMapping/>
-  </p:clrMapOvr>
-</p:sld>
-</file>
-
-<file path=ppt/slides/slide4.xml><?xml version="1.0" encoding="utf-8"?>
-<p:sld xmlns:a="http://schemas.openxmlformats.org/drawingml/2006/main" xmlns:r="http://schemas.openxmlformats.org/officeDocument/2006/relationships" xmlns:p="http://schemas.openxmlformats.org/presentationml/2006/main">
-  <p:cSld>
-    <p:spTree>
-      <p:nvGrpSpPr>
-        <p:cNvPr id="1" name=""/>
-        <p:cNvGrpSpPr/>
-        <p:nvPr/>
-      </p:nvGrpSpPr>
-      <p:grpSpPr>
-        <a:xfrm>
-          <a:off x="0" y="0"/>
-          <a:ext cx="0" cy="0"/>
-          <a:chOff x="0" y="0"/>
-          <a:chExt cx="0" cy="0"/>
-        </a:xfrm>
-      </p:grpSpPr>
-      <p:pic>
-        <p:nvPicPr>
-          <p:cNvPr id="3" name="Picture 2"/>
-          <p:cNvPicPr>
-            <a:picLocks noChangeAspect="1"/>
-          </p:cNvPicPr>
-          <p:nvPr/>
-        </p:nvPicPr>
-        <p:blipFill>
-          <a:blip r:embed="rId2"/>
-          <a:stretch>
-            <a:fillRect/>
-          </a:stretch>
-        </p:blipFill>
-        <p:spPr>
-          <a:xfrm>
-            <a:off x="1596189" y="94122"/>
-            <a:ext cx="8879305" cy="2824619"/>
-          </a:xfrm>
-          <a:prstGeom prst="rect">
-            <a:avLst/>
-          </a:prstGeom>
-        </p:spPr>
-      </p:pic>
-      <p:pic>
-        <p:nvPicPr>
-          <p:cNvPr id="4" name="Picture 3"/>
-          <p:cNvPicPr>
-            <a:picLocks noChangeAspect="1"/>
-          </p:cNvPicPr>
-          <p:nvPr/>
-        </p:nvPicPr>
-        <p:blipFill>
-          <a:blip r:embed="rId3"/>
-          <a:stretch>
-            <a:fillRect/>
-          </a:stretch>
-        </p:blipFill>
-        <p:spPr>
-          <a:xfrm>
-            <a:off x="280214" y="3040698"/>
-            <a:ext cx="4893365" cy="3336038"/>
-          </a:xfrm>
-          <a:prstGeom prst="rect">
-            <a:avLst/>
-          </a:prstGeom>
-        </p:spPr>
-      </p:pic>
-      <p:pic>
-        <p:nvPicPr>
-          <p:cNvPr id="5" name="Picture 4"/>
-          <p:cNvPicPr>
-            <a:picLocks noChangeAspect="1"/>
-          </p:cNvPicPr>
-          <p:nvPr/>
-        </p:nvPicPr>
-        <p:blipFill>
-          <a:blip r:embed="rId4"/>
-          <a:stretch>
-            <a:fillRect/>
-          </a:stretch>
-        </p:blipFill>
-        <p:spPr>
-          <a:xfrm>
-            <a:off x="5797308" y="3184357"/>
-            <a:ext cx="5237656" cy="3319212"/>
-          </a:xfrm>
-          <a:prstGeom prst="rect">
-            <a:avLst/>
-          </a:prstGeom>
-        </p:spPr>
-      </p:pic>
-    </p:spTree>
-    <p:extLst>
-      <p:ext uri="{BB962C8B-B14F-4D97-AF65-F5344CB8AC3E}">
-        <p14:creationId xmlns:p14="http://schemas.microsoft.com/office/powerpoint/2010/main" val="2852330953"/>
-      </p:ext>
-    </p:extLst>
-  </p:cSld>
-  <p:clrMapOvr>
-    <a:masterClrMapping/>
-  </p:clrMapOvr>
-</p:sld>
-</file>
-
-<file path=ppt/slides/slide5.xml><?xml version="1.0" encoding="utf-8"?>
-<p:sld xmlns:a="http://schemas.openxmlformats.org/drawingml/2006/main" xmlns:r="http://schemas.openxmlformats.org/officeDocument/2006/relationships" xmlns:p="http://schemas.openxmlformats.org/presentationml/2006/main">
-  <p:cSld>
-    <p:spTree>
-      <p:nvGrpSpPr>
-        <p:cNvPr id="1" name=""/>
-        <p:cNvGrpSpPr/>
-        <p:nvPr/>
-      </p:nvGrpSpPr>
-      <p:grpSpPr>
-        <a:xfrm>
-          <a:off x="0" y="0"/>
-          <a:ext cx="0" cy="0"/>
-          <a:chOff x="0" y="0"/>
-          <a:chExt cx="0" cy="0"/>
-        </a:xfrm>
-      </p:grpSpPr>
-      <p:sp>
-        <p:nvSpPr>
-          <p:cNvPr id="2" name="Title 1"/>
-          <p:cNvSpPr>
-            <a:spLocks noGrp="1"/>
-          </p:cNvSpPr>
-          <p:nvPr>
-            <p:ph type="title"/>
-          </p:nvPr>
-        </p:nvSpPr>
-        <p:spPr/>
-        <p:txBody>
-          <a:bodyPr/>
-          <a:lstStyle/>
-          <a:p>
-            <a:r>
-              <a:rPr lang="en-US" dirty="0"/>
-              <a:t>Problem with </a:t>
-            </a:r>
-            <a:r>
-              <a:rPr lang="en-US" dirty="0" err="1"/>
-              <a:t>RadioDriver</a:t>
-            </a:r>
-            <a:endParaRPr lang="en-US" dirty="0"/>
-          </a:p>
-        </p:txBody>
-      </p:sp>
-      <p:sp>
-        <p:nvSpPr>
-          <p:cNvPr id="3" name="Content Placeholder 2"/>
-          <p:cNvSpPr>
-            <a:spLocks noGrp="1"/>
-          </p:cNvSpPr>
-          <p:nvPr>
-            <p:ph idx="1"/>
-          </p:nvPr>
-        </p:nvSpPr>
-        <p:spPr/>
-        <p:txBody>
-          <a:bodyPr>
-            <a:normAutofit lnSpcReduction="10000"/>
-          </a:bodyPr>
-          <a:lstStyle/>
-          <a:p>
-            <a:r>
-              <a:rPr lang="en-US" dirty="0"/>
-              <a:t>Transformation modifies </a:t>
-            </a:r>
-            <a:r>
-              <a:rPr lang="en-US" dirty="0" err="1"/>
-              <a:t>RadioDriver</a:t>
-            </a:r>
-            <a:r>
-              <a:rPr lang="en-US" dirty="0"/>
-              <a:t> component by adding two new features:</a:t>
-            </a:r>
-          </a:p>
-          <a:p>
-            <a:pPr lvl="1"/>
-            <a:r>
-              <a:rPr lang="en-US" dirty="0" err="1"/>
-              <a:t>am_request</a:t>
-            </a:r>
-            <a:r>
-              <a:rPr lang="en-US" dirty="0"/>
-              <a:t> : in data port</a:t>
-            </a:r>
-          </a:p>
-          <a:p>
-            <a:pPr lvl="1"/>
-            <a:r>
-              <a:rPr lang="en-US" dirty="0" err="1"/>
-              <a:t>am_response</a:t>
-            </a:r>
-            <a:r>
-              <a:rPr lang="en-US" dirty="0"/>
-              <a:t>: out data port</a:t>
-            </a:r>
-          </a:p>
-          <a:p>
-            <a:r>
-              <a:rPr lang="en-US" dirty="0"/>
-              <a:t>This modification will be reflected in other implementations that contain </a:t>
-            </a:r>
-            <a:r>
-              <a:rPr lang="en-US" dirty="0" err="1"/>
-              <a:t>RadioDriver</a:t>
-            </a:r>
-            <a:endParaRPr lang="en-US" dirty="0"/>
-          </a:p>
-          <a:p>
-            <a:pPr lvl="1"/>
-            <a:r>
-              <a:rPr lang="en-US" dirty="0"/>
-              <a:t>We don’t want this!</a:t>
-            </a:r>
-          </a:p>
-          <a:p>
-            <a:r>
-              <a:rPr lang="en-US" dirty="0"/>
-              <a:t>Options</a:t>
-            </a:r>
-          </a:p>
-          <a:p>
-            <a:pPr lvl="1"/>
-            <a:r>
-              <a:rPr lang="en-US" dirty="0"/>
-              <a:t>Use transformed </a:t>
-            </a:r>
-            <a:r>
-              <a:rPr lang="en-US" dirty="0" err="1"/>
-              <a:t>RadioDriver</a:t>
-            </a:r>
-            <a:r>
-              <a:rPr lang="en-US" dirty="0"/>
-              <a:t> </a:t>
-            </a:r>
-            <a:r>
-              <a:rPr lang="en-US" dirty="0">
-                <a:sym typeface="Wingdings" panose="05000000000000000000" pitchFamily="2" charset="2"/>
-              </a:rPr>
-              <a:t> BAD</a:t>
-            </a:r>
-            <a:endParaRPr lang="en-US" dirty="0"/>
-          </a:p>
-          <a:p>
-            <a:pPr lvl="1"/>
-            <a:r>
-              <a:rPr lang="en-US" dirty="0"/>
-              <a:t>Create a copy of </a:t>
-            </a:r>
-            <a:r>
-              <a:rPr lang="en-US" dirty="0" err="1"/>
-              <a:t>RadioDriver</a:t>
-            </a:r>
-            <a:r>
-              <a:rPr lang="en-US" dirty="0"/>
-              <a:t> and use in transformed model </a:t>
-            </a:r>
-            <a:r>
-              <a:rPr lang="en-US" dirty="0">
-                <a:sym typeface="Wingdings" panose="05000000000000000000" pitchFamily="2" charset="2"/>
-              </a:rPr>
-              <a:t> LESS BAD</a:t>
-            </a:r>
-            <a:endParaRPr lang="en-US" dirty="0"/>
-          </a:p>
-          <a:p>
-            <a:pPr lvl="1"/>
-            <a:r>
-              <a:rPr lang="en-US" dirty="0"/>
-              <a:t>Extend </a:t>
-            </a:r>
-            <a:r>
-              <a:rPr lang="en-US" dirty="0" err="1"/>
-              <a:t>RadioDriver</a:t>
-            </a:r>
-            <a:r>
-              <a:rPr lang="en-US" dirty="0"/>
-              <a:t> and use in transformed model </a:t>
-            </a:r>
-            <a:r>
-              <a:rPr lang="en-US" dirty="0">
-                <a:sym typeface="Wingdings" panose="05000000000000000000" pitchFamily="2" charset="2"/>
-              </a:rPr>
-              <a:t> OKAY, I GUESS</a:t>
-            </a:r>
-            <a:endParaRPr lang="en-US" dirty="0"/>
-          </a:p>
-        </p:txBody>
-      </p:sp>
-    </p:spTree>
-    <p:extLst>
-      <p:ext uri="{BB962C8B-B14F-4D97-AF65-F5344CB8AC3E}">
-        <p14:creationId xmlns:p14="http://schemas.microsoft.com/office/powerpoint/2010/main" val="972853300"/>
-      </p:ext>
-    </p:extLst>
-  </p:cSld>
-  <p:clrMapOvr>
-    <a:masterClrMapping/>
-  </p:clrMapOvr>
-</p:sld>
-</file>
-
-<file path=ppt/slides/slide6.xml><?xml version="1.0" encoding="utf-8"?>
-<p:sld xmlns:a="http://schemas.openxmlformats.org/drawingml/2006/main" xmlns:r="http://schemas.openxmlformats.org/officeDocument/2006/relationships" xmlns:p="http://schemas.openxmlformats.org/presentationml/2006/main">
-  <p:cSld>
-    <p:spTree>
-      <p:nvGrpSpPr>
-        <p:cNvPr id="1" name=""/>
-        <p:cNvGrpSpPr/>
-        <p:nvPr/>
-      </p:nvGrpSpPr>
-      <p:grpSpPr>
-        <a:xfrm>
-          <a:off x="0" y="0"/>
-          <a:ext cx="0" cy="0"/>
-          <a:chOff x="0" y="0"/>
-          <a:chExt cx="0" cy="0"/>
-        </a:xfrm>
-      </p:grpSpPr>
-      <p:sp>
-        <p:nvSpPr>
-          <p:cNvPr id="2" name="Title 1"/>
-          <p:cNvSpPr>
-            <a:spLocks noGrp="1"/>
-          </p:cNvSpPr>
-          <p:nvPr>
-            <p:ph type="title"/>
-          </p:nvPr>
-        </p:nvSpPr>
-        <p:spPr/>
-        <p:txBody>
-          <a:bodyPr/>
-          <a:lstStyle/>
-          <a:p>
-            <a:r>
-              <a:rPr lang="en-US" dirty="0"/>
-              <a:t>Extending </a:t>
-            </a:r>
-            <a:r>
-              <a:rPr lang="en-US" dirty="0" err="1"/>
-              <a:t>RadioDriver</a:t>
-            </a:r>
-            <a:r>
-              <a:rPr lang="en-US" dirty="0"/>
-              <a:t> Component</a:t>
-            </a:r>
-          </a:p>
-        </p:txBody>
-      </p:sp>
-      <p:pic>
-        <p:nvPicPr>
-          <p:cNvPr id="4" name="Picture 3"/>
-          <p:cNvPicPr>
-            <a:picLocks noChangeAspect="1"/>
-          </p:cNvPicPr>
-          <p:nvPr/>
-        </p:nvPicPr>
-        <p:blipFill>
-          <a:blip r:embed="rId2"/>
-          <a:stretch>
-            <a:fillRect/>
-          </a:stretch>
-        </p:blipFill>
-        <p:spPr>
-          <a:xfrm>
-            <a:off x="204035" y="2608471"/>
-            <a:ext cx="5891965" cy="2883191"/>
-          </a:xfrm>
-          <a:prstGeom prst="rect">
-            <a:avLst/>
-          </a:prstGeom>
-        </p:spPr>
-      </p:pic>
-      <p:pic>
-        <p:nvPicPr>
-          <p:cNvPr id="5" name="Picture 4"/>
-          <p:cNvPicPr>
-            <a:picLocks noChangeAspect="1"/>
-          </p:cNvPicPr>
-          <p:nvPr/>
-        </p:nvPicPr>
-        <p:blipFill>
-          <a:blip r:embed="rId3"/>
-          <a:stretch>
-            <a:fillRect/>
-          </a:stretch>
-        </p:blipFill>
-        <p:spPr>
-          <a:xfrm>
-            <a:off x="6336631" y="2608471"/>
-            <a:ext cx="5776161" cy="3651916"/>
-          </a:xfrm>
-          <a:prstGeom prst="rect">
-            <a:avLst/>
-          </a:prstGeom>
-        </p:spPr>
-      </p:pic>
-      <p:sp>
-        <p:nvSpPr>
-          <p:cNvPr id="3" name="TextBox 2">
-            <a:extLst>
-              <a:ext uri="{FF2B5EF4-FFF2-40B4-BE49-F238E27FC236}">
-                <a16:creationId xmlns:a16="http://schemas.microsoft.com/office/drawing/2014/main" id="{71D9B5A8-EEA8-3E40-BFF8-D31530C20675}"/>
-              </a:ext>
-            </a:extLst>
-          </p:cNvPr>
-          <p:cNvSpPr txBox="1"/>
-          <p:nvPr/>
-        </p:nvSpPr>
-        <p:spPr>
-          <a:xfrm>
-            <a:off x="838200" y="1503248"/>
-            <a:ext cx="10267122" cy="646331"/>
-          </a:xfrm>
-          <a:prstGeom prst="rect">
-            <a:avLst/>
-          </a:prstGeom>
-          <a:noFill/>
-        </p:spPr>
-        <p:txBody>
-          <a:bodyPr wrap="square" rtlCol="0">
-            <a:spAutoFit/>
-          </a:bodyPr>
-          <a:lstStyle/>
-          <a:p>
-            <a:r>
-              <a:rPr lang="en-US" dirty="0"/>
-              <a:t>Source Example: </a:t>
-            </a:r>
-            <a:r>
-              <a:rPr lang="en-US" dirty="0">
-                <a:hlinkClick r:id="rId4"/>
-              </a:rPr>
-              <a:t>https://github.com/loonwerks/CASE/blob/master/TA2/Simple_Example_V3_Exploratory/SW_EXTEND.aadl</a:t>
-            </a:r>
-            <a:endParaRPr lang="en-US" dirty="0"/>
-          </a:p>
-        </p:txBody>
-      </p:sp>
-    </p:spTree>
-    <p:extLst>
-      <p:ext uri="{BB962C8B-B14F-4D97-AF65-F5344CB8AC3E}">
-        <p14:creationId xmlns:p14="http://schemas.microsoft.com/office/powerpoint/2010/main" val="386551624"/>
-      </p:ext>
-    </p:extLst>
-  </p:cSld>
-  <p:clrMapOvr>
-    <a:masterClrMapping/>
-  </p:clrMapOvr>
-</p:sld>
-</file>
-
-<file path=ppt/slides/slide7.xml><?xml version="1.0" encoding="utf-8"?>
-<p:sld xmlns:a="http://schemas.openxmlformats.org/drawingml/2006/main" xmlns:r="http://schemas.openxmlformats.org/officeDocument/2006/relationships" xmlns:p="http://schemas.openxmlformats.org/presentationml/2006/main">
-  <p:cSld>
-    <p:spTree>
-      <p:nvGrpSpPr>
-        <p:cNvPr id="1" name=""/>
-        <p:cNvGrpSpPr/>
-        <p:nvPr/>
-      </p:nvGrpSpPr>
-      <p:grpSpPr>
-        <a:xfrm>
-          <a:off x="0" y="0"/>
-          <a:ext cx="0" cy="0"/>
-          <a:chOff x="0" y="0"/>
-          <a:chExt cx="0" cy="0"/>
-        </a:xfrm>
-      </p:grpSpPr>
-      <p:sp>
-        <p:nvSpPr>
-          <p:cNvPr id="2" name="Title 1"/>
-          <p:cNvSpPr>
-            <a:spLocks noGrp="1"/>
-          </p:cNvSpPr>
-          <p:nvPr>
-            <p:ph type="title"/>
-          </p:nvPr>
-        </p:nvSpPr>
-        <p:spPr/>
-        <p:txBody>
-          <a:bodyPr/>
-          <a:lstStyle/>
-          <a:p>
-            <a:r>
-              <a:rPr lang="en-US" dirty="0"/>
-              <a:t>Problem with Extending </a:t>
-            </a:r>
-            <a:r>
-              <a:rPr lang="en-US" dirty="0" err="1"/>
-              <a:t>RadioDriver</a:t>
-            </a:r>
-            <a:endParaRPr lang="en-US" dirty="0"/>
-          </a:p>
-        </p:txBody>
-      </p:sp>
-      <p:sp>
-        <p:nvSpPr>
-          <p:cNvPr id="3" name="Content Placeholder 2"/>
-          <p:cNvSpPr>
-            <a:spLocks noGrp="1"/>
-          </p:cNvSpPr>
-          <p:nvPr>
-            <p:ph idx="1"/>
-          </p:nvPr>
-        </p:nvSpPr>
-        <p:spPr/>
-        <p:txBody>
-          <a:bodyPr/>
-          <a:lstStyle/>
-          <a:p>
-            <a:r>
-              <a:rPr lang="en-US" dirty="0"/>
-              <a:t>AGREE statements specified in </a:t>
-            </a:r>
-            <a:r>
-              <a:rPr lang="en-US" dirty="0" err="1"/>
-              <a:t>RadioDriver</a:t>
-            </a:r>
-            <a:r>
-              <a:rPr lang="en-US" dirty="0"/>
-              <a:t> are not extended</a:t>
-            </a:r>
-          </a:p>
-          <a:p>
-            <a:pPr lvl="1"/>
-            <a:r>
-              <a:rPr lang="en-US" dirty="0">
-                <a:sym typeface="Wingdings" panose="05000000000000000000" pitchFamily="2" charset="2"/>
-              </a:rPr>
-              <a:t> AGREE will fail</a:t>
-            </a:r>
-            <a:endParaRPr lang="en-US" dirty="0"/>
-          </a:p>
-        </p:txBody>
-      </p:sp>
-      <p:pic>
-        <p:nvPicPr>
-          <p:cNvPr id="4" name="Picture 3"/>
-          <p:cNvPicPr>
-            <a:picLocks noChangeAspect="1"/>
-          </p:cNvPicPr>
-          <p:nvPr/>
-        </p:nvPicPr>
-        <p:blipFill>
-          <a:blip r:embed="rId2"/>
-          <a:stretch>
-            <a:fillRect/>
-          </a:stretch>
-        </p:blipFill>
-        <p:spPr>
-          <a:xfrm>
-            <a:off x="285750" y="3154067"/>
-            <a:ext cx="11620500" cy="2705100"/>
-          </a:xfrm>
-          <a:prstGeom prst="rect">
-            <a:avLst/>
-          </a:prstGeom>
-        </p:spPr>
-      </p:pic>
-    </p:spTree>
-    <p:extLst>
-      <p:ext uri="{BB962C8B-B14F-4D97-AF65-F5344CB8AC3E}">
-        <p14:creationId xmlns:p14="http://schemas.microsoft.com/office/powerpoint/2010/main" val="4212222686"/>
-      </p:ext>
-    </p:extLst>
-  </p:cSld>
-  <p:clrMapOvr>
-    <a:masterClrMapping/>
-  </p:clrMapOvr>
-</p:sld>
-</file>
-
-<file path=ppt/slides/slide8.xml><?xml version="1.0" encoding="utf-8"?>
-<p:sld xmlns:a="http://schemas.openxmlformats.org/drawingml/2006/main" xmlns:r="http://schemas.openxmlformats.org/officeDocument/2006/relationships" xmlns:p="http://schemas.openxmlformats.org/presentationml/2006/main">
-  <p:cSld>
-    <p:spTree>
-      <p:nvGrpSpPr>
-        <p:cNvPr id="1" name=""/>
-        <p:cNvGrpSpPr/>
-        <p:nvPr/>
-      </p:nvGrpSpPr>
-      <p:grpSpPr>
-        <a:xfrm>
-          <a:off x="0" y="0"/>
-          <a:ext cx="0" cy="0"/>
-          <a:chOff x="0" y="0"/>
-          <a:chExt cx="0" cy="0"/>
-        </a:xfrm>
-      </p:grpSpPr>
-      <p:sp>
-        <p:nvSpPr>
           <p:cNvPr id="2" name="Title 1">
             <a:extLst>
               <a:ext uri="{FF2B5EF4-FFF2-40B4-BE49-F238E27FC236}">
@@ -5387,7 +3762,7 @@
 </p:sld>
 </file>
 
-<file path=ppt/slides/slide9.xml><?xml version="1.0" encoding="utf-8"?>
+<file path=ppt/slides/slide2.xml><?xml version="1.0" encoding="utf-8"?>
 <p:sld xmlns:a="http://schemas.openxmlformats.org/drawingml/2006/main" xmlns:r="http://schemas.openxmlformats.org/officeDocument/2006/relationships" xmlns:p="http://schemas.openxmlformats.org/presentationml/2006/main">
   <p:cSld>
     <p:spTree>

</xml_diff>